<commit_message>
day1 session 3 Virtualization and CM slides
</commit_message>
<xml_diff>
--- a/doc/slides/day1/session3/UNIXCLI.pptx
+++ b/doc/slides/day1/session3/UNIXCLI.pptx
@@ -1,6 +1,6 @@
 
 <file path=ppt/presentation.xml><?xml version="1.0" encoding="utf-8"?>
-<p:presentation xmlns:a="http://schemas.openxmlformats.org/drawingml/2006/main" xmlns:r="http://schemas.openxmlformats.org/officeDocument/2006/relationships" xmlns:mc="http://schemas.openxmlformats.org/markup-compatibility/2006" xmlns:mv="urn:schemas-microsoft-com:mac:vml" xmlns:p="http://schemas.openxmlformats.org/presentationml/2006/main" mc:Ignorable="mv" mc:PreserveAttributes="mv:*" saveSubsetFonts="1" autoCompressPictures="0">
+<p:presentation xmlns:a="http://schemas.openxmlformats.org/drawingml/2006/main" xmlns:r="http://schemas.openxmlformats.org/officeDocument/2006/relationships" xmlns:p="http://schemas.openxmlformats.org/presentationml/2006/main" saveSubsetFonts="1" autoCompressPictures="0">
   <p:sldMasterIdLst>
     <p:sldMasterId id="2147483648" r:id="rId1"/>
   </p:sldMasterIdLst>
@@ -121,7 +121,7 @@
 </file>
 
 <file path=ppt/notesMasters/notesMaster1.xml><?xml version="1.0" encoding="utf-8"?>
-<p:notesMaster xmlns:a="http://schemas.openxmlformats.org/drawingml/2006/main" xmlns:r="http://schemas.openxmlformats.org/officeDocument/2006/relationships" xmlns:mc="http://schemas.openxmlformats.org/markup-compatibility/2006" xmlns:mv="urn:schemas-microsoft-com:mac:vml" xmlns:p="http://schemas.openxmlformats.org/presentationml/2006/main" mc:Ignorable="mv" mc:PreserveAttributes="mv:*">
+<p:notesMaster xmlns:a="http://schemas.openxmlformats.org/drawingml/2006/main" xmlns:r="http://schemas.openxmlformats.org/officeDocument/2006/relationships" xmlns:p="http://schemas.openxmlformats.org/presentationml/2006/main">
   <p:cSld>
     <p:bg>
       <p:bgRef idx="1001">
@@ -203,7 +203,7 @@
             <a:fld id="{212AA354-AE5B-9442-9520-E20E873FCE1D}" type="datetimeFigureOut">
               <a:rPr lang="en-US" smtClean="0"/>
               <a:pPr/>
-              <a:t>9/4/12</a:t>
+              <a:t>10/15/13</a:t>
             </a:fld>
             <a:endParaRPr lang="en-US"/>
           </a:p>
@@ -372,6 +372,11 @@
         </p:txBody>
       </p:sp>
     </p:spTree>
+    <p:extLst>
+      <p:ext uri="{BB962C8B-B14F-4D97-AF65-F5344CB8AC3E}">
+        <p14:creationId xmlns:p14="http://schemas.microsoft.com/office/powerpoint/2010/main" val="4047429853"/>
+      </p:ext>
+    </p:extLst>
   </p:cSld>
   <p:clrMap bg1="lt1" tx1="dk1" bg2="lt2" tx2="dk2" accent1="accent1" accent2="accent2" accent3="accent3" accent4="accent4" accent5="accent5" accent6="accent6" hlink="hlink" folHlink="folHlink"/>
   <p:notesStyle>
@@ -470,7 +475,7 @@
 </file>
 
 <file path=ppt/notesSlides/notesSlide1.xml><?xml version="1.0" encoding="utf-8"?>
-<p:notes xmlns:a="http://schemas.openxmlformats.org/drawingml/2006/main" xmlns:r="http://schemas.openxmlformats.org/officeDocument/2006/relationships" xmlns:mc="http://schemas.openxmlformats.org/markup-compatibility/2006" xmlns:mv="urn:schemas-microsoft-com:mac:vml" xmlns:p="http://schemas.openxmlformats.org/presentationml/2006/main" mc:Ignorable="mv" mc:PreserveAttributes="mv:*">
+<p:notes xmlns:a="http://schemas.openxmlformats.org/drawingml/2006/main" xmlns:r="http://schemas.openxmlformats.org/officeDocument/2006/relationships" xmlns:p="http://schemas.openxmlformats.org/presentationml/2006/main">
   <p:cSld>
     <p:spTree>
       <p:nvGrpSpPr>
@@ -588,7 +593,7 @@
 </file>
 
 <file path=ppt/notesSlides/notesSlide2.xml><?xml version="1.0" encoding="utf-8"?>
-<p:notes xmlns:a="http://schemas.openxmlformats.org/drawingml/2006/main" xmlns:r="http://schemas.openxmlformats.org/officeDocument/2006/relationships" xmlns:mc="http://schemas.openxmlformats.org/markup-compatibility/2006" xmlns:mv="urn:schemas-microsoft-com:mac:vml" xmlns:p="http://schemas.openxmlformats.org/presentationml/2006/main" mc:Ignorable="mv" mc:PreserveAttributes="mv:*">
+<p:notes xmlns:a="http://schemas.openxmlformats.org/drawingml/2006/main" xmlns:r="http://schemas.openxmlformats.org/officeDocument/2006/relationships" xmlns:p="http://schemas.openxmlformats.org/presentationml/2006/main">
   <p:cSld>
     <p:spTree>
       <p:nvGrpSpPr>
@@ -682,7 +687,7 @@
 </file>
 
 <file path=ppt/slideLayouts/slideLayout1.xml><?xml version="1.0" encoding="utf-8"?>
-<p:sldLayout xmlns:a="http://schemas.openxmlformats.org/drawingml/2006/main" xmlns:r="http://schemas.openxmlformats.org/officeDocument/2006/relationships" xmlns:mc="http://schemas.openxmlformats.org/markup-compatibility/2006" xmlns:mv="urn:schemas-microsoft-com:mac:vml" xmlns:p="http://schemas.openxmlformats.org/presentationml/2006/main" mc:Ignorable="mv" mc:PreserveAttributes="mv:*" type="title" preserve="1">
+<p:sldLayout xmlns:a="http://schemas.openxmlformats.org/drawingml/2006/main" xmlns:r="http://schemas.openxmlformats.org/officeDocument/2006/relationships" xmlns:p="http://schemas.openxmlformats.org/presentationml/2006/main" type="title" preserve="1">
   <p:cSld name="Title Slide">
     <p:spTree>
       <p:nvGrpSpPr>
@@ -863,7 +868,7 @@
             <a:fld id="{6A504196-4937-5640-86EA-1E28139B6342}" type="datetimeFigureOut">
               <a:rPr lang="en-US" smtClean="0"/>
               <a:pPr/>
-              <a:t>9/4/12</a:t>
+              <a:t>10/15/13</a:t>
             </a:fld>
             <a:endParaRPr lang="en-US"/>
           </a:p>
@@ -921,7 +926,7 @@
 </file>
 
 <file path=ppt/slideLayouts/slideLayout10.xml><?xml version="1.0" encoding="utf-8"?>
-<p:sldLayout xmlns:a="http://schemas.openxmlformats.org/drawingml/2006/main" xmlns:r="http://schemas.openxmlformats.org/officeDocument/2006/relationships" xmlns:mc="http://schemas.openxmlformats.org/markup-compatibility/2006" xmlns:mv="urn:schemas-microsoft-com:mac:vml" xmlns:p="http://schemas.openxmlformats.org/presentationml/2006/main" mc:Ignorable="mv" mc:PreserveAttributes="mv:*" type="vertTx" preserve="1">
+<p:sldLayout xmlns:a="http://schemas.openxmlformats.org/drawingml/2006/main" xmlns:r="http://schemas.openxmlformats.org/officeDocument/2006/relationships" xmlns:p="http://schemas.openxmlformats.org/presentationml/2006/main" type="vertTx" preserve="1">
   <p:cSld name="Title and Vertical Text">
     <p:spTree>
       <p:nvGrpSpPr>
@@ -1030,7 +1035,7 @@
             <a:fld id="{6A504196-4937-5640-86EA-1E28139B6342}" type="datetimeFigureOut">
               <a:rPr lang="en-US" smtClean="0"/>
               <a:pPr/>
-              <a:t>9/4/12</a:t>
+              <a:t>10/15/13</a:t>
             </a:fld>
             <a:endParaRPr lang="en-US"/>
           </a:p>
@@ -1088,7 +1093,7 @@
 </file>
 
 <file path=ppt/slideLayouts/slideLayout11.xml><?xml version="1.0" encoding="utf-8"?>
-<p:sldLayout xmlns:a="http://schemas.openxmlformats.org/drawingml/2006/main" xmlns:r="http://schemas.openxmlformats.org/officeDocument/2006/relationships" xmlns:mc="http://schemas.openxmlformats.org/markup-compatibility/2006" xmlns:mv="urn:schemas-microsoft-com:mac:vml" xmlns:p="http://schemas.openxmlformats.org/presentationml/2006/main" mc:Ignorable="mv" mc:PreserveAttributes="mv:*" type="vertTitleAndTx" preserve="1">
+<p:sldLayout xmlns:a="http://schemas.openxmlformats.org/drawingml/2006/main" xmlns:r="http://schemas.openxmlformats.org/officeDocument/2006/relationships" xmlns:p="http://schemas.openxmlformats.org/presentationml/2006/main" type="vertTitleAndTx" preserve="1">
   <p:cSld name="Vertical Title and Text">
     <p:spTree>
       <p:nvGrpSpPr>
@@ -1207,7 +1212,7 @@
             <a:fld id="{6A504196-4937-5640-86EA-1E28139B6342}" type="datetimeFigureOut">
               <a:rPr lang="en-US" smtClean="0"/>
               <a:pPr/>
-              <a:t>9/4/12</a:t>
+              <a:t>10/15/13</a:t>
             </a:fld>
             <a:endParaRPr lang="en-US"/>
           </a:p>
@@ -1265,7 +1270,7 @@
 </file>
 
 <file path=ppt/slideLayouts/slideLayout2.xml><?xml version="1.0" encoding="utf-8"?>
-<p:sldLayout xmlns:a="http://schemas.openxmlformats.org/drawingml/2006/main" xmlns:r="http://schemas.openxmlformats.org/officeDocument/2006/relationships" xmlns:mc="http://schemas.openxmlformats.org/markup-compatibility/2006" xmlns:mv="urn:schemas-microsoft-com:mac:vml" xmlns:p="http://schemas.openxmlformats.org/presentationml/2006/main" mc:Ignorable="mv" mc:PreserveAttributes="mv:*" type="obj" preserve="1">
+<p:sldLayout xmlns:a="http://schemas.openxmlformats.org/drawingml/2006/main" xmlns:r="http://schemas.openxmlformats.org/officeDocument/2006/relationships" xmlns:p="http://schemas.openxmlformats.org/presentationml/2006/main" type="obj" preserve="1">
   <p:cSld name="Title and Content">
     <p:spTree>
       <p:nvGrpSpPr>
@@ -1374,7 +1379,7 @@
             <a:fld id="{6A504196-4937-5640-86EA-1E28139B6342}" type="datetimeFigureOut">
               <a:rPr lang="en-US" smtClean="0"/>
               <a:pPr/>
-              <a:t>9/4/12</a:t>
+              <a:t>10/15/13</a:t>
             </a:fld>
             <a:endParaRPr lang="en-US"/>
           </a:p>
@@ -1432,7 +1437,7 @@
 </file>
 
 <file path=ppt/slideLayouts/slideLayout3.xml><?xml version="1.0" encoding="utf-8"?>
-<p:sldLayout xmlns:a="http://schemas.openxmlformats.org/drawingml/2006/main" xmlns:r="http://schemas.openxmlformats.org/officeDocument/2006/relationships" xmlns:mc="http://schemas.openxmlformats.org/markup-compatibility/2006" xmlns:mv="urn:schemas-microsoft-com:mac:vml" xmlns:p="http://schemas.openxmlformats.org/presentationml/2006/main" mc:Ignorable="mv" mc:PreserveAttributes="mv:*" type="secHead" preserve="1">
+<p:sldLayout xmlns:a="http://schemas.openxmlformats.org/drawingml/2006/main" xmlns:r="http://schemas.openxmlformats.org/officeDocument/2006/relationships" xmlns:p="http://schemas.openxmlformats.org/presentationml/2006/main" type="secHead" preserve="1">
   <p:cSld name="Section Header">
     <p:spTree>
       <p:nvGrpSpPr>
@@ -1617,7 +1622,7 @@
             <a:fld id="{6A504196-4937-5640-86EA-1E28139B6342}" type="datetimeFigureOut">
               <a:rPr lang="en-US" smtClean="0"/>
               <a:pPr/>
-              <a:t>9/4/12</a:t>
+              <a:t>10/15/13</a:t>
             </a:fld>
             <a:endParaRPr lang="en-US"/>
           </a:p>
@@ -1675,7 +1680,7 @@
 </file>
 
 <file path=ppt/slideLayouts/slideLayout4.xml><?xml version="1.0" encoding="utf-8"?>
-<p:sldLayout xmlns:a="http://schemas.openxmlformats.org/drawingml/2006/main" xmlns:r="http://schemas.openxmlformats.org/officeDocument/2006/relationships" xmlns:mc="http://schemas.openxmlformats.org/markup-compatibility/2006" xmlns:mv="urn:schemas-microsoft-com:mac:vml" xmlns:p="http://schemas.openxmlformats.org/presentationml/2006/main" mc:Ignorable="mv" mc:PreserveAttributes="mv:*" type="twoObj" preserve="1">
+<p:sldLayout xmlns:a="http://schemas.openxmlformats.org/drawingml/2006/main" xmlns:r="http://schemas.openxmlformats.org/officeDocument/2006/relationships" xmlns:p="http://schemas.openxmlformats.org/presentationml/2006/main" type="twoObj" preserve="1">
   <p:cSld name="Two Content">
     <p:spTree>
       <p:nvGrpSpPr>
@@ -1902,7 +1907,7 @@
             <a:fld id="{6A504196-4937-5640-86EA-1E28139B6342}" type="datetimeFigureOut">
               <a:rPr lang="en-US" smtClean="0"/>
               <a:pPr/>
-              <a:t>9/4/12</a:t>
+              <a:t>10/15/13</a:t>
             </a:fld>
             <a:endParaRPr lang="en-US"/>
           </a:p>
@@ -1960,7 +1965,7 @@
 </file>
 
 <file path=ppt/slideLayouts/slideLayout5.xml><?xml version="1.0" encoding="utf-8"?>
-<p:sldLayout xmlns:a="http://schemas.openxmlformats.org/drawingml/2006/main" xmlns:r="http://schemas.openxmlformats.org/officeDocument/2006/relationships" xmlns:mc="http://schemas.openxmlformats.org/markup-compatibility/2006" xmlns:mv="urn:schemas-microsoft-com:mac:vml" xmlns:p="http://schemas.openxmlformats.org/presentationml/2006/main" mc:Ignorable="mv" mc:PreserveAttributes="mv:*" type="twoTxTwoObj" preserve="1">
+<p:sldLayout xmlns:a="http://schemas.openxmlformats.org/drawingml/2006/main" xmlns:r="http://schemas.openxmlformats.org/officeDocument/2006/relationships" xmlns:p="http://schemas.openxmlformats.org/presentationml/2006/main" type="twoTxTwoObj" preserve="1">
   <p:cSld name="Comparison">
     <p:spTree>
       <p:nvGrpSpPr>
@@ -2321,7 +2326,7 @@
             <a:fld id="{6A504196-4937-5640-86EA-1E28139B6342}" type="datetimeFigureOut">
               <a:rPr lang="en-US" smtClean="0"/>
               <a:pPr/>
-              <a:t>9/4/12</a:t>
+              <a:t>10/15/13</a:t>
             </a:fld>
             <a:endParaRPr lang="en-US"/>
           </a:p>
@@ -2379,7 +2384,7 @@
 </file>
 
 <file path=ppt/slideLayouts/slideLayout6.xml><?xml version="1.0" encoding="utf-8"?>
-<p:sldLayout xmlns:a="http://schemas.openxmlformats.org/drawingml/2006/main" xmlns:r="http://schemas.openxmlformats.org/officeDocument/2006/relationships" xmlns:mc="http://schemas.openxmlformats.org/markup-compatibility/2006" xmlns:mv="urn:schemas-microsoft-com:mac:vml" xmlns:p="http://schemas.openxmlformats.org/presentationml/2006/main" mc:Ignorable="mv" mc:PreserveAttributes="mv:*" type="titleOnly" preserve="1">
+<p:sldLayout xmlns:a="http://schemas.openxmlformats.org/drawingml/2006/main" xmlns:r="http://schemas.openxmlformats.org/officeDocument/2006/relationships" xmlns:p="http://schemas.openxmlformats.org/presentationml/2006/main" type="titleOnly" preserve="1">
   <p:cSld name="Title Only">
     <p:spTree>
       <p:nvGrpSpPr>
@@ -2436,7 +2441,7 @@
             <a:fld id="{6A504196-4937-5640-86EA-1E28139B6342}" type="datetimeFigureOut">
               <a:rPr lang="en-US" smtClean="0"/>
               <a:pPr/>
-              <a:t>9/4/12</a:t>
+              <a:t>10/15/13</a:t>
             </a:fld>
             <a:endParaRPr lang="en-US"/>
           </a:p>
@@ -2494,7 +2499,7 @@
 </file>
 
 <file path=ppt/slideLayouts/slideLayout7.xml><?xml version="1.0" encoding="utf-8"?>
-<p:sldLayout xmlns:a="http://schemas.openxmlformats.org/drawingml/2006/main" xmlns:r="http://schemas.openxmlformats.org/officeDocument/2006/relationships" xmlns:mc="http://schemas.openxmlformats.org/markup-compatibility/2006" xmlns:mv="urn:schemas-microsoft-com:mac:vml" xmlns:p="http://schemas.openxmlformats.org/presentationml/2006/main" mc:Ignorable="mv" mc:PreserveAttributes="mv:*" type="blank" preserve="1">
+<p:sldLayout xmlns:a="http://schemas.openxmlformats.org/drawingml/2006/main" xmlns:r="http://schemas.openxmlformats.org/officeDocument/2006/relationships" xmlns:p="http://schemas.openxmlformats.org/presentationml/2006/main" type="blank" preserve="1">
   <p:cSld name="Blank">
     <p:spTree>
       <p:nvGrpSpPr>
@@ -2528,7 +2533,7 @@
             <a:fld id="{6A504196-4937-5640-86EA-1E28139B6342}" type="datetimeFigureOut">
               <a:rPr lang="en-US" smtClean="0"/>
               <a:pPr/>
-              <a:t>9/4/12</a:t>
+              <a:t>10/15/13</a:t>
             </a:fld>
             <a:endParaRPr lang="en-US"/>
           </a:p>
@@ -2586,7 +2591,7 @@
 </file>
 
 <file path=ppt/slideLayouts/slideLayout8.xml><?xml version="1.0" encoding="utf-8"?>
-<p:sldLayout xmlns:a="http://schemas.openxmlformats.org/drawingml/2006/main" xmlns:r="http://schemas.openxmlformats.org/officeDocument/2006/relationships" xmlns:mc="http://schemas.openxmlformats.org/markup-compatibility/2006" xmlns:mv="urn:schemas-microsoft-com:mac:vml" xmlns:p="http://schemas.openxmlformats.org/presentationml/2006/main" mc:Ignorable="mv" mc:PreserveAttributes="mv:*" type="objTx" preserve="1">
+<p:sldLayout xmlns:a="http://schemas.openxmlformats.org/drawingml/2006/main" xmlns:r="http://schemas.openxmlformats.org/officeDocument/2006/relationships" xmlns:p="http://schemas.openxmlformats.org/presentationml/2006/main" type="objTx" preserve="1">
   <p:cSld name="Content with Caption">
     <p:spTree>
       <p:nvGrpSpPr>
@@ -2802,7 +2807,7 @@
             <a:fld id="{6A504196-4937-5640-86EA-1E28139B6342}" type="datetimeFigureOut">
               <a:rPr lang="en-US" smtClean="0"/>
               <a:pPr/>
-              <a:t>9/4/12</a:t>
+              <a:t>10/15/13</a:t>
             </a:fld>
             <a:endParaRPr lang="en-US"/>
           </a:p>
@@ -2860,7 +2865,7 @@
 </file>
 
 <file path=ppt/slideLayouts/slideLayout9.xml><?xml version="1.0" encoding="utf-8"?>
-<p:sldLayout xmlns:a="http://schemas.openxmlformats.org/drawingml/2006/main" xmlns:r="http://schemas.openxmlformats.org/officeDocument/2006/relationships" xmlns:mc="http://schemas.openxmlformats.org/markup-compatibility/2006" xmlns:mv="urn:schemas-microsoft-com:mac:vml" xmlns:p="http://schemas.openxmlformats.org/presentationml/2006/main" mc:Ignorable="mv" mc:PreserveAttributes="mv:*" type="picTx" preserve="1">
+<p:sldLayout xmlns:a="http://schemas.openxmlformats.org/drawingml/2006/main" xmlns:r="http://schemas.openxmlformats.org/officeDocument/2006/relationships" xmlns:p="http://schemas.openxmlformats.org/presentationml/2006/main" type="picTx" preserve="1">
   <p:cSld name="Picture with Caption">
     <p:spTree>
       <p:nvGrpSpPr>
@@ -3052,7 +3057,7 @@
             <a:fld id="{6A504196-4937-5640-86EA-1E28139B6342}" type="datetimeFigureOut">
               <a:rPr lang="en-US" smtClean="0"/>
               <a:pPr/>
-              <a:t>9/4/12</a:t>
+              <a:t>10/15/13</a:t>
             </a:fld>
             <a:endParaRPr lang="en-US"/>
           </a:p>
@@ -3110,7 +3115,7 @@
 </file>
 
 <file path=ppt/slideMasters/slideMaster1.xml><?xml version="1.0" encoding="utf-8"?>
-<p:sldMaster xmlns:a="http://schemas.openxmlformats.org/drawingml/2006/main" xmlns:r="http://schemas.openxmlformats.org/officeDocument/2006/relationships" xmlns:mc="http://schemas.openxmlformats.org/markup-compatibility/2006" xmlns:mv="urn:schemas-microsoft-com:mac:vml" xmlns:p="http://schemas.openxmlformats.org/presentationml/2006/main" mc:Ignorable="mv" mc:PreserveAttributes="mv:*">
+<p:sldMaster xmlns:a="http://schemas.openxmlformats.org/drawingml/2006/main" xmlns:r="http://schemas.openxmlformats.org/officeDocument/2006/relationships" xmlns:p="http://schemas.openxmlformats.org/presentationml/2006/main">
   <p:cSld>
     <p:bg>
       <p:bgRef idx="1001">
@@ -3262,7 +3267,7 @@
             <a:fld id="{6A504196-4937-5640-86EA-1E28139B6342}" type="datetimeFigureOut">
               <a:rPr lang="en-US" smtClean="0"/>
               <a:pPr/>
-              <a:t>9/4/12</a:t>
+              <a:t>10/15/13</a:t>
             </a:fld>
             <a:endParaRPr lang="en-US"/>
           </a:p>
@@ -3617,7 +3622,7 @@
 </file>
 
 <file path=ppt/slides/slide1.xml><?xml version="1.0" encoding="utf-8"?>
-<p:sld xmlns:a="http://schemas.openxmlformats.org/drawingml/2006/main" xmlns:r="http://schemas.openxmlformats.org/officeDocument/2006/relationships" xmlns:mc="http://schemas.openxmlformats.org/markup-compatibility/2006" xmlns:mv="urn:schemas-microsoft-com:mac:vml" xmlns:p="http://schemas.openxmlformats.org/presentationml/2006/main" mc:Ignorable="mv" mc:PreserveAttributes="mv:*">
+<p:sld xmlns:a="http://schemas.openxmlformats.org/drawingml/2006/main" xmlns:r="http://schemas.openxmlformats.org/officeDocument/2006/relationships" xmlns:p="http://schemas.openxmlformats.org/presentationml/2006/main">
   <p:cSld>
     <p:spTree>
       <p:nvGrpSpPr>
@@ -3687,7 +3692,7 @@
   <p:timing>
     <p:tnLst>
       <p:par>
-        <p:cTn id="1" dur="indefinite" restart="never" nodeType="tmRoot"/>
+        <p:cTn xmlns:p14="http://schemas.microsoft.com/office/powerpoint/2010/main" id="1" dur="indefinite" restart="never" nodeType="tmRoot"/>
       </p:par>
     </p:tnLst>
   </p:timing>
@@ -3695,7 +3700,7 @@
 </file>
 
 <file path=ppt/slides/slide10.xml><?xml version="1.0" encoding="utf-8"?>
-<p:sld xmlns:a="http://schemas.openxmlformats.org/drawingml/2006/main" xmlns:r="http://schemas.openxmlformats.org/officeDocument/2006/relationships" xmlns:mc="http://schemas.openxmlformats.org/markup-compatibility/2006" xmlns:mv="urn:schemas-microsoft-com:mac:vml" xmlns:p="http://schemas.openxmlformats.org/presentationml/2006/main" mc:Ignorable="mv" mc:PreserveAttributes="mv:*">
+<p:sld xmlns:a="http://schemas.openxmlformats.org/drawingml/2006/main" xmlns:r="http://schemas.openxmlformats.org/officeDocument/2006/relationships" xmlns:p="http://schemas.openxmlformats.org/presentationml/2006/main">
   <p:cSld>
     <p:spTree>
       <p:nvGrpSpPr>
@@ -3944,7 +3949,7 @@
   <p:timing>
     <p:tnLst>
       <p:par>
-        <p:cTn id="1" dur="indefinite" restart="never" nodeType="tmRoot"/>
+        <p:cTn xmlns:p14="http://schemas.microsoft.com/office/powerpoint/2010/main" id="1" dur="indefinite" restart="never" nodeType="tmRoot"/>
       </p:par>
     </p:tnLst>
   </p:timing>
@@ -3952,7 +3957,7 @@
 </file>
 
 <file path=ppt/slides/slide11.xml><?xml version="1.0" encoding="utf-8"?>
-<p:sld xmlns:a="http://schemas.openxmlformats.org/drawingml/2006/main" xmlns:r="http://schemas.openxmlformats.org/officeDocument/2006/relationships" xmlns:mc="http://schemas.openxmlformats.org/markup-compatibility/2006" xmlns:mv="urn:schemas-microsoft-com:mac:vml" xmlns:p="http://schemas.openxmlformats.org/presentationml/2006/main" mc:Ignorable="mv" mc:PreserveAttributes="mv:*">
+<p:sld xmlns:a="http://schemas.openxmlformats.org/drawingml/2006/main" xmlns:r="http://schemas.openxmlformats.org/officeDocument/2006/relationships" xmlns:p="http://schemas.openxmlformats.org/presentationml/2006/main">
   <p:cSld>
     <p:spTree>
       <p:nvGrpSpPr>
@@ -4059,15 +4064,7 @@
             </a:pPr>
             <a:r>
               <a:rPr lang="en-US" sz="1400" dirty="0" smtClean="0"/>
-              <a:t>Set a normal variable called </a:t>
-            </a:r>
-            <a:r>
-              <a:rPr lang="en-US" sz="1400" dirty="0" smtClean="0"/>
-              <a:t>MYTEST </a:t>
-            </a:r>
-            <a:r>
-              <a:rPr lang="en-US" sz="1400" dirty="0" smtClean="0"/>
-              <a:t>which holds some string. Is this in your environment?</a:t>
+              <a:t>Set a normal variable called MYTEST which holds some string. Is this in your environment?</a:t>
             </a:r>
           </a:p>
           <a:p>
@@ -4077,23 +4074,7 @@
             </a:pPr>
             <a:r>
               <a:rPr lang="en-US" sz="1400" dirty="0" smtClean="0"/>
-              <a:t>Make</a:t>
-            </a:r>
-            <a:r>
-              <a:rPr lang="en-US" sz="1400" dirty="0" smtClean="0"/>
-              <a:t> </a:t>
-            </a:r>
-            <a:r>
-              <a:rPr lang="en-US" sz="1400" dirty="0" smtClean="0"/>
-              <a:t>MYTEST </a:t>
-            </a:r>
-            <a:r>
-              <a:rPr lang="en-US" sz="1400" dirty="0" smtClean="0"/>
-              <a:t>an </a:t>
-            </a:r>
-            <a:r>
-              <a:rPr lang="en-US" sz="1400" dirty="0" smtClean="0"/>
-              <a:t>environment variable.</a:t>
+              <a:t>Make MYTEST an environment variable.</a:t>
             </a:r>
           </a:p>
           <a:p>
@@ -4103,15 +4084,7 @@
             </a:pPr>
             <a:r>
               <a:rPr lang="en-US" sz="1400" dirty="0" smtClean="0"/>
-              <a:t>Create an environment variable called </a:t>
-            </a:r>
-            <a:r>
-              <a:rPr lang="en-US" sz="1400" dirty="0" smtClean="0"/>
-              <a:t>MYTEST2 </a:t>
-            </a:r>
-            <a:r>
-              <a:rPr lang="en-US" sz="1400" dirty="0" smtClean="0"/>
-              <a:t>set to some number, using only one </a:t>
+              <a:t>Create an environment variable called MYTEST2 set to some number, using only one </a:t>
             </a:r>
             <a:r>
               <a:rPr lang="en-US" sz="1400" dirty="0" err="1" smtClean="0"/>
@@ -4129,23 +4102,7 @@
             </a:pPr>
             <a:r>
               <a:rPr lang="en-US" sz="1400" dirty="0" smtClean="0"/>
-              <a:t>Make it so that</a:t>
-            </a:r>
-            <a:r>
-              <a:rPr lang="en-US" sz="1400" dirty="0" smtClean="0"/>
-              <a:t> </a:t>
-            </a:r>
-            <a:r>
-              <a:rPr lang="en-US" sz="1400" dirty="0" smtClean="0"/>
-              <a:t>MYTEST2 </a:t>
-            </a:r>
-            <a:r>
-              <a:rPr lang="en-US" sz="1400" dirty="0" smtClean="0"/>
-              <a:t>is </a:t>
-            </a:r>
-            <a:r>
-              <a:rPr lang="en-US" sz="1400" dirty="0" smtClean="0"/>
-              <a:t>automatically set each time you login to your terminal application.</a:t>
+              <a:t>Make it so that MYTEST2 is automatically set each time you login to your terminal application.</a:t>
             </a:r>
           </a:p>
           <a:p>
@@ -4173,11 +4130,7 @@
             </a:pPr>
             <a:r>
               <a:rPr lang="en-US" sz="1400" dirty="0" smtClean="0"/>
-              <a:t>Create a</a:t>
-            </a:r>
-            <a:r>
-              <a:rPr lang="en-US" sz="1400" dirty="0" smtClean="0"/>
-              <a:t> ’</a:t>
+              <a:t>Create a ’</a:t>
             </a:r>
             <a:r>
               <a:rPr lang="en-US" sz="1400" dirty="0" err="1" smtClean="0"/>
@@ -4185,11 +4138,7 @@
             </a:r>
             <a:r>
               <a:rPr lang="en-US" sz="1400" dirty="0" smtClean="0"/>
-              <a:t>' </a:t>
-            </a:r>
-            <a:r>
-              <a:rPr lang="en-US" sz="1400" dirty="0" smtClean="0"/>
-              <a:t>directory in your HOME directory from the </a:t>
+              <a:t>' directory in your HOME directory from the </a:t>
             </a:r>
             <a:r>
               <a:rPr lang="en-US" sz="1400" dirty="0" err="1" smtClean="0"/>
@@ -4207,11 +4156,11 @@
             </a:pPr>
             <a:r>
               <a:rPr lang="en-US" sz="1400" dirty="0" smtClean="0"/>
-              <a:t>Rename that directory to</a:t>
+              <a:t>Rename that directory to ’</a:t>
             </a:r>
             <a:r>
               <a:rPr lang="en-US" sz="1400" dirty="0" smtClean="0"/>
-              <a:t> ’arangs12' </a:t>
+              <a:t>arangs13' </a:t>
             </a:r>
             <a:r>
               <a:rPr lang="en-US" sz="1400" dirty="0" smtClean="0"/>
@@ -4243,7 +4192,6 @@
               <a:rPr lang="en-US" sz="1400" dirty="0" smtClean="0"/>
               <a:t> interpreter executable.</a:t>
             </a:r>
-            <a:endParaRPr lang="en-US" sz="1400" dirty="0" smtClean="0"/>
           </a:p>
           <a:p>
             <a:pPr marL="334800" indent="-334800">
@@ -4252,15 +4200,7 @@
             </a:pPr>
             <a:r>
               <a:rPr lang="en-US" sz="1400" dirty="0" smtClean="0"/>
-              <a:t>How are </a:t>
-            </a:r>
-            <a:r>
-              <a:rPr lang="en-US" sz="1400" dirty="0" smtClean="0"/>
-              <a:t>directories and</a:t>
-            </a:r>
-            <a:r>
-              <a:rPr lang="en-US" sz="1400" dirty="0" smtClean="0"/>
-              <a:t> files listed differently when using </a:t>
+              <a:t>How are directories and files listed differently when using </a:t>
             </a:r>
             <a:r>
               <a:rPr lang="en-US" sz="1400" dirty="0" err="1" smtClean="0"/>
@@ -4278,7 +4218,6 @@
               <a:rPr lang="en-US" sz="1400" dirty="0" smtClean="0"/>
               <a:t>.</a:t>
             </a:r>
-            <a:endParaRPr lang="en-US" sz="1400" dirty="0" smtClean="0"/>
           </a:p>
           <a:p>
             <a:pPr marL="334800" indent="-334800">
@@ -4287,11 +4226,7 @@
             </a:pPr>
             <a:r>
               <a:rPr lang="en-US" sz="1400" dirty="0" smtClean="0"/>
-              <a:t>Use </a:t>
-            </a:r>
-            <a:r>
-              <a:rPr lang="en-US" sz="1400" dirty="0" smtClean="0"/>
-              <a:t>touch to create an empty file in / (the real root directory). What happens and why?</a:t>
+              <a:t>Use touch to create an empty file in / (the real root directory). What happens and why?</a:t>
             </a:r>
           </a:p>
           <a:p>
@@ -4301,23 +4236,7 @@
             </a:pPr>
             <a:r>
               <a:rPr lang="en-US" sz="1400" dirty="0" smtClean="0"/>
-              <a:t>Repeat your attempt to create the empty file in /, but</a:t>
-            </a:r>
-            <a:r>
-              <a:rPr lang="en-US" sz="1400" dirty="0" smtClean="0"/>
-              <a:t> re-direct </a:t>
-            </a:r>
-            <a:r>
-              <a:rPr lang="en-US" sz="1400" dirty="0" smtClean="0"/>
-              <a:t>the warning</a:t>
-            </a:r>
-            <a:r>
-              <a:rPr lang="en-US" sz="1400" dirty="0" smtClean="0"/>
-              <a:t> to </a:t>
-            </a:r>
-            <a:r>
-              <a:rPr lang="en-US" sz="1400" dirty="0" smtClean="0"/>
-              <a:t>a separate file called </a:t>
+              <a:t>Repeat your attempt to create the empty file in /, but re-direct the warning to a separate file called </a:t>
             </a:r>
             <a:r>
               <a:rPr lang="en-US" sz="1400" dirty="0" err="1" smtClean="0"/>
@@ -4345,7 +4264,6 @@
               <a:rPr lang="en-US" sz="1400" dirty="0" smtClean="0"/>
               <a:t>.</a:t>
             </a:r>
-            <a:endParaRPr lang="en-US" sz="1400" dirty="0" smtClean="0"/>
           </a:p>
           <a:p>
             <a:pPr marL="334800" indent="-334800">
@@ -4354,11 +4272,7 @@
             </a:pPr>
             <a:r>
               <a:rPr lang="en-US" sz="1400" dirty="0" smtClean="0"/>
-              <a:t>There </a:t>
-            </a:r>
-            <a:r>
-              <a:rPr lang="en-US" sz="1400" dirty="0" smtClean="0"/>
-              <a:t>is a very useful program in </a:t>
+              <a:t>There is a very useful program in </a:t>
             </a:r>
             <a:r>
               <a:rPr lang="en-US" sz="1400" dirty="0" err="1" smtClean="0"/>
@@ -4414,7 +4328,7 @@
   <p:timing>
     <p:tnLst>
       <p:par>
-        <p:cTn id="1" dur="indefinite" restart="never" nodeType="tmRoot"/>
+        <p:cTn xmlns:p14="http://schemas.microsoft.com/office/powerpoint/2010/main" id="1" dur="indefinite" restart="never" nodeType="tmRoot"/>
       </p:par>
     </p:tnLst>
   </p:timing>
@@ -4422,7 +4336,7 @@
 </file>
 
 <file path=ppt/slides/slide2.xml><?xml version="1.0" encoding="utf-8"?>
-<p:sld xmlns:a="http://schemas.openxmlformats.org/drawingml/2006/main" xmlns:r="http://schemas.openxmlformats.org/officeDocument/2006/relationships" xmlns:mc="http://schemas.openxmlformats.org/markup-compatibility/2006" xmlns:mv="urn:schemas-microsoft-com:mac:vml" xmlns:p="http://schemas.openxmlformats.org/presentationml/2006/main" mc:Ignorable="mv" mc:PreserveAttributes="mv:*">
+<p:sld xmlns:a="http://schemas.openxmlformats.org/drawingml/2006/main" xmlns:r="http://schemas.openxmlformats.org/officeDocument/2006/relationships" xmlns:p="http://schemas.openxmlformats.org/presentationml/2006/main">
   <p:cSld>
     <p:spTree>
       <p:nvGrpSpPr>
@@ -4528,7 +4442,7 @@
   <p:timing>
     <p:tnLst>
       <p:par>
-        <p:cTn id="1" dur="indefinite" restart="never" nodeType="tmRoot"/>
+        <p:cTn xmlns:p14="http://schemas.microsoft.com/office/powerpoint/2010/main" id="1" dur="indefinite" restart="never" nodeType="tmRoot"/>
       </p:par>
     </p:tnLst>
   </p:timing>
@@ -4536,7 +4450,7 @@
 </file>
 
 <file path=ppt/slides/slide3.xml><?xml version="1.0" encoding="utf-8"?>
-<p:sld xmlns:a="http://schemas.openxmlformats.org/drawingml/2006/main" xmlns:r="http://schemas.openxmlformats.org/officeDocument/2006/relationships" xmlns:mc="http://schemas.openxmlformats.org/markup-compatibility/2006" xmlns:mv="urn:schemas-microsoft-com:mac:vml" xmlns:p="http://schemas.openxmlformats.org/presentationml/2006/main" mc:Ignorable="mv" mc:PreserveAttributes="mv:*">
+<p:sld xmlns:a="http://schemas.openxmlformats.org/drawingml/2006/main" xmlns:r="http://schemas.openxmlformats.org/officeDocument/2006/relationships" xmlns:p="http://schemas.openxmlformats.org/presentationml/2006/main">
   <p:cSld>
     <p:spTree>
       <p:nvGrpSpPr>
@@ -4695,7 +4609,7 @@
   <p:timing>
     <p:tnLst>
       <p:par>
-        <p:cTn id="1" dur="indefinite" restart="never" nodeType="tmRoot"/>
+        <p:cTn xmlns:p14="http://schemas.microsoft.com/office/powerpoint/2010/main" id="1" dur="indefinite" restart="never" nodeType="tmRoot"/>
       </p:par>
     </p:tnLst>
   </p:timing>
@@ -4703,7 +4617,7 @@
 </file>
 
 <file path=ppt/slides/slide4.xml><?xml version="1.0" encoding="utf-8"?>
-<p:sld xmlns:a="http://schemas.openxmlformats.org/drawingml/2006/main" xmlns:r="http://schemas.openxmlformats.org/officeDocument/2006/relationships" xmlns:mc="http://schemas.openxmlformats.org/markup-compatibility/2006" xmlns:mv="urn:schemas-microsoft-com:mac:vml" xmlns:p="http://schemas.openxmlformats.org/presentationml/2006/main" mc:Ignorable="mv" mc:PreserveAttributes="mv:*">
+<p:sld xmlns:a="http://schemas.openxmlformats.org/drawingml/2006/main" xmlns:r="http://schemas.openxmlformats.org/officeDocument/2006/relationships" xmlns:p="http://schemas.openxmlformats.org/presentationml/2006/main">
   <p:cSld>
     <p:spTree>
       <p:nvGrpSpPr>
@@ -4736,11 +4650,7 @@
           <a:p>
             <a:r>
               <a:rPr lang="en-US" dirty="0" smtClean="0"/>
-              <a:t>UNIX file</a:t>
-            </a:r>
-            <a:r>
-              <a:rPr lang="en-US" dirty="0" smtClean="0"/>
-              <a:t> system conventions</a:t>
+              <a:t>UNIX file system conventions</a:t>
             </a:r>
             <a:endParaRPr lang="en-US" dirty="0"/>
           </a:p>
@@ -4768,11 +4678,7 @@
             </a:pPr>
             <a:r>
               <a:rPr lang="en-US" dirty="0" smtClean="0"/>
-              <a:t>UNIX-like file </a:t>
-            </a:r>
-            <a:r>
-              <a:rPr lang="en-US" dirty="0" smtClean="0"/>
-              <a:t>systems:</a:t>
+              <a:t>UNIX-like file systems:</a:t>
             </a:r>
           </a:p>
           <a:p>
@@ -4796,15 +4702,7 @@
           <a:p>
             <a:r>
               <a:rPr lang="en-US" dirty="0" smtClean="0"/>
-              <a:t>c</a:t>
-            </a:r>
-            <a:r>
-              <a:rPr lang="en-US" dirty="0" smtClean="0"/>
-              <a:t>onsider files simple byte arrays (and text</a:t>
-            </a:r>
-            <a:r>
-              <a:rPr lang="en-US" dirty="0" smtClean="0"/>
-              <a:t>)</a:t>
+              <a:t>consider files simple byte arrays (and text)</a:t>
             </a:r>
             <a:endParaRPr lang="en-US" dirty="0"/>
           </a:p>
@@ -5170,7 +5068,7 @@
   <p:timing>
     <p:tnLst>
       <p:par>
-        <p:cTn id="1" dur="indefinite" restart="never" nodeType="tmRoot"/>
+        <p:cTn xmlns:p14="http://schemas.microsoft.com/office/powerpoint/2010/main" id="1" dur="indefinite" restart="never" nodeType="tmRoot"/>
       </p:par>
     </p:tnLst>
   </p:timing>
@@ -5178,7 +5076,7 @@
 </file>
 
 <file path=ppt/slides/slide5.xml><?xml version="1.0" encoding="utf-8"?>
-<p:sld xmlns:a="http://schemas.openxmlformats.org/drawingml/2006/main" xmlns:r="http://schemas.openxmlformats.org/officeDocument/2006/relationships" xmlns:mc="http://schemas.openxmlformats.org/markup-compatibility/2006" xmlns:mv="urn:schemas-microsoft-com:mac:vml" xmlns:p="http://schemas.openxmlformats.org/presentationml/2006/main" mc:Ignorable="mv" mc:PreserveAttributes="mv:*">
+<p:sld xmlns:a="http://schemas.openxmlformats.org/drawingml/2006/main" xmlns:r="http://schemas.openxmlformats.org/officeDocument/2006/relationships" xmlns:p="http://schemas.openxmlformats.org/presentationml/2006/main">
   <p:cSld>
     <p:spTree>
       <p:nvGrpSpPr>
@@ -5211,11 +5109,7 @@
           <a:p>
             <a:r>
               <a:rPr lang="en-US" dirty="0" smtClean="0"/>
-              <a:t>File</a:t>
-            </a:r>
-            <a:r>
-              <a:rPr lang="en-US" dirty="0" smtClean="0"/>
-              <a:t> access</a:t>
+              <a:t>File access</a:t>
             </a:r>
             <a:endParaRPr lang="en-US" dirty="0"/>
           </a:p>
@@ -5276,7 +5170,6 @@
               <a:rPr lang="en-US" dirty="0" smtClean="0"/>
               <a:t>To read from or write to a file, a file handle is opened</a:t>
             </a:r>
-            <a:endParaRPr lang="en-US" dirty="0" smtClean="0"/>
           </a:p>
           <a:p>
             <a:r>
@@ -5295,7 +5188,7 @@
   <p:timing>
     <p:tnLst>
       <p:par>
-        <p:cTn id="1" dur="indefinite" restart="never" nodeType="tmRoot"/>
+        <p:cTn xmlns:p14="http://schemas.microsoft.com/office/powerpoint/2010/main" id="1" dur="indefinite" restart="never" nodeType="tmRoot"/>
       </p:par>
     </p:tnLst>
   </p:timing>
@@ -5303,7 +5196,7 @@
 </file>
 
 <file path=ppt/slides/slide6.xml><?xml version="1.0" encoding="utf-8"?>
-<p:sld xmlns:a="http://schemas.openxmlformats.org/drawingml/2006/main" xmlns:r="http://schemas.openxmlformats.org/officeDocument/2006/relationships" xmlns:mc="http://schemas.openxmlformats.org/markup-compatibility/2006" xmlns:mv="urn:schemas-microsoft-com:mac:vml" xmlns:p="http://schemas.openxmlformats.org/presentationml/2006/main" mc:Ignorable="mv" mc:PreserveAttributes="mv:*">
+<p:sld xmlns:a="http://schemas.openxmlformats.org/drawingml/2006/main" xmlns:r="http://schemas.openxmlformats.org/officeDocument/2006/relationships" xmlns:p="http://schemas.openxmlformats.org/presentationml/2006/main">
   <p:cSld>
     <p:spTree>
       <p:nvGrpSpPr>
@@ -6466,7 +6359,7 @@
   <p:timing>
     <p:tnLst>
       <p:par>
-        <p:cTn id="1" dur="indefinite" restart="never" nodeType="tmRoot"/>
+        <p:cTn xmlns:p14="http://schemas.microsoft.com/office/powerpoint/2010/main" id="1" dur="indefinite" restart="never" nodeType="tmRoot"/>
       </p:par>
     </p:tnLst>
   </p:timing>
@@ -6474,7 +6367,7 @@
 </file>
 
 <file path=ppt/slides/slide7.xml><?xml version="1.0" encoding="utf-8"?>
-<p:sld xmlns:a="http://schemas.openxmlformats.org/drawingml/2006/main" xmlns:r="http://schemas.openxmlformats.org/officeDocument/2006/relationships" xmlns:mc="http://schemas.openxmlformats.org/markup-compatibility/2006" xmlns:mv="urn:schemas-microsoft-com:mac:vml" xmlns:p="http://schemas.openxmlformats.org/presentationml/2006/main" mc:Ignorable="mv" mc:PreserveAttributes="mv:*">
+<p:sld xmlns:a="http://schemas.openxmlformats.org/drawingml/2006/main" xmlns:r="http://schemas.openxmlformats.org/officeDocument/2006/relationships" xmlns:p="http://schemas.openxmlformats.org/presentationml/2006/main">
   <p:cSld>
     <p:spTree>
       <p:nvGrpSpPr>
@@ -6530,11 +6423,7 @@
           <a:p>
             <a:r>
               <a:rPr lang="en-US" dirty="0" smtClean="0"/>
-              <a:t>UNIX programs by default </a:t>
-            </a:r>
-            <a:r>
-              <a:rPr lang="en-US" dirty="0" smtClean="0"/>
-              <a:t>write to STDOUT and read from STDIN</a:t>
+              <a:t>UNIX programs by default write to STDOUT and read from STDIN</a:t>
             </a:r>
           </a:p>
           <a:p>
@@ -6613,7 +6502,7 @@
   <p:timing>
     <p:tnLst>
       <p:par>
-        <p:cTn id="1" dur="indefinite" restart="never" nodeType="tmRoot"/>
+        <p:cTn xmlns:p14="http://schemas.microsoft.com/office/powerpoint/2010/main" id="1" dur="indefinite" restart="never" nodeType="tmRoot"/>
       </p:par>
     </p:tnLst>
   </p:timing>
@@ -6621,7 +6510,7 @@
 </file>
 
 <file path=ppt/slides/slide8.xml><?xml version="1.0" encoding="utf-8"?>
-<p:sld xmlns:a="http://schemas.openxmlformats.org/drawingml/2006/main" xmlns:r="http://schemas.openxmlformats.org/officeDocument/2006/relationships" xmlns:mc="http://schemas.openxmlformats.org/markup-compatibility/2006" xmlns:mv="urn:schemas-microsoft-com:mac:vml" xmlns:p="http://schemas.openxmlformats.org/presentationml/2006/main" mc:Ignorable="mv" mc:PreserveAttributes="mv:*">
+<p:sld xmlns:a="http://schemas.openxmlformats.org/drawingml/2006/main" xmlns:r="http://schemas.openxmlformats.org/officeDocument/2006/relationships" xmlns:p="http://schemas.openxmlformats.org/presentationml/2006/main">
   <p:cSld>
     <p:spTree>
       <p:nvGrpSpPr>
@@ -6684,11 +6573,7 @@
           <a:p>
             <a:r>
               <a:rPr lang="en-US" sz="2400" dirty="0" smtClean="0"/>
-              <a:t>Th</a:t>
-            </a:r>
-            <a:r>
-              <a:rPr lang="en-US" sz="2400" dirty="0" smtClean="0"/>
-              <a:t>e shell environment is configured using variables, i.e. things with a name and a value.</a:t>
+              <a:t>The shell environment is configured using variables, i.e. things with a name and a value.</a:t>
             </a:r>
           </a:p>
           <a:p>
@@ -6755,7 +6640,7 @@
         </p:nvGraphicFramePr>
         <p:xfrm>
           <a:off x="4267200" y="1874837"/>
-          <a:ext cx="4419600" cy="3337560"/>
+          <a:ext cx="4419600" cy="3606800"/>
         </p:xfrm>
         <a:graphic>
           <a:graphicData uri="http://schemas.openxmlformats.org/drawingml/2006/table">
@@ -7057,7 +6942,7 @@
   <p:timing>
     <p:tnLst>
       <p:par>
-        <p:cTn id="1" dur="indefinite" restart="never" nodeType="tmRoot"/>
+        <p:cTn xmlns:p14="http://schemas.microsoft.com/office/powerpoint/2010/main" id="1" dur="indefinite" restart="never" nodeType="tmRoot"/>
       </p:par>
     </p:tnLst>
   </p:timing>
@@ -7065,7 +6950,7 @@
 </file>
 
 <file path=ppt/slides/slide9.xml><?xml version="1.0" encoding="utf-8"?>
-<p:sld xmlns:a="http://schemas.openxmlformats.org/drawingml/2006/main" xmlns:r="http://schemas.openxmlformats.org/officeDocument/2006/relationships" xmlns:mc="http://schemas.openxmlformats.org/markup-compatibility/2006" xmlns:mv="urn:schemas-microsoft-com:mac:vml" xmlns:p="http://schemas.openxmlformats.org/presentationml/2006/main" mc:Ignorable="mv" mc:PreserveAttributes="mv:*">
+<p:sld xmlns:a="http://schemas.openxmlformats.org/drawingml/2006/main" xmlns:r="http://schemas.openxmlformats.org/officeDocument/2006/relationships" xmlns:p="http://schemas.openxmlformats.org/presentationml/2006/main">
   <p:cSld>
     <p:spTree>
       <p:nvGrpSpPr>
@@ -7201,7 +7086,7 @@
   <p:timing>
     <p:tnLst>
       <p:par>
-        <p:cTn id="1" dur="indefinite" restart="never" nodeType="tmRoot"/>
+        <p:cTn xmlns:p14="http://schemas.microsoft.com/office/powerpoint/2010/main" id="1" dur="indefinite" restart="never" nodeType="tmRoot"/>
       </p:par>
     </p:tnLst>
   </p:timing>

</xml_diff>

<commit_message>
checked and updated third set of slides
</commit_message>
<xml_diff>
--- a/doc/slides/day1/session3/UNIXCLI.pptx
+++ b/doc/slides/day1/session3/UNIXCLI.pptx
@@ -203,7 +203,7 @@
             <a:fld id="{212AA354-AE5B-9442-9520-E20E873FCE1D}" type="datetimeFigureOut">
               <a:rPr lang="en-US" smtClean="0"/>
               <a:pPr/>
-              <a:t>10/15/13</a:t>
+              <a:t>10/17/13</a:t>
             </a:fld>
             <a:endParaRPr lang="en-US"/>
           </a:p>
@@ -365,7 +365,7 @@
             <a:fld id="{9DBAAB30-7614-204B-A67D-41A54EA59D42}" type="slidenum">
               <a:rPr lang="en-US" smtClean="0"/>
               <a:pPr/>
-              <a:t>‹#›</a:t>
+              <a:t>‹nr.›</a:t>
             </a:fld>
             <a:endParaRPr lang="en-US"/>
           </a:p>
@@ -868,7 +868,7 @@
             <a:fld id="{6A504196-4937-5640-86EA-1E28139B6342}" type="datetimeFigureOut">
               <a:rPr lang="en-US" smtClean="0"/>
               <a:pPr/>
-              <a:t>10/15/13</a:t>
+              <a:t>10/17/13</a:t>
             </a:fld>
             <a:endParaRPr lang="en-US"/>
           </a:p>
@@ -911,7 +911,7 @@
             <a:fld id="{5605EB78-CF4B-0945-B41F-5A6B72103240}" type="slidenum">
               <a:rPr lang="en-US" smtClean="0"/>
               <a:pPr/>
-              <a:t>‹#›</a:t>
+              <a:t>‹nr.›</a:t>
             </a:fld>
             <a:endParaRPr lang="en-US"/>
           </a:p>
@@ -1035,7 +1035,7 @@
             <a:fld id="{6A504196-4937-5640-86EA-1E28139B6342}" type="datetimeFigureOut">
               <a:rPr lang="en-US" smtClean="0"/>
               <a:pPr/>
-              <a:t>10/15/13</a:t>
+              <a:t>10/17/13</a:t>
             </a:fld>
             <a:endParaRPr lang="en-US"/>
           </a:p>
@@ -1078,7 +1078,7 @@
             <a:fld id="{5605EB78-CF4B-0945-B41F-5A6B72103240}" type="slidenum">
               <a:rPr lang="en-US" smtClean="0"/>
               <a:pPr/>
-              <a:t>‹#›</a:t>
+              <a:t>‹nr.›</a:t>
             </a:fld>
             <a:endParaRPr lang="en-US"/>
           </a:p>
@@ -1212,7 +1212,7 @@
             <a:fld id="{6A504196-4937-5640-86EA-1E28139B6342}" type="datetimeFigureOut">
               <a:rPr lang="en-US" smtClean="0"/>
               <a:pPr/>
-              <a:t>10/15/13</a:t>
+              <a:t>10/17/13</a:t>
             </a:fld>
             <a:endParaRPr lang="en-US"/>
           </a:p>
@@ -1255,7 +1255,7 @@
             <a:fld id="{5605EB78-CF4B-0945-B41F-5A6B72103240}" type="slidenum">
               <a:rPr lang="en-US" smtClean="0"/>
               <a:pPr/>
-              <a:t>‹#›</a:t>
+              <a:t>‹nr.›</a:t>
             </a:fld>
             <a:endParaRPr lang="en-US"/>
           </a:p>
@@ -1379,7 +1379,7 @@
             <a:fld id="{6A504196-4937-5640-86EA-1E28139B6342}" type="datetimeFigureOut">
               <a:rPr lang="en-US" smtClean="0"/>
               <a:pPr/>
-              <a:t>10/15/13</a:t>
+              <a:t>10/17/13</a:t>
             </a:fld>
             <a:endParaRPr lang="en-US"/>
           </a:p>
@@ -1422,7 +1422,7 @@
             <a:fld id="{5605EB78-CF4B-0945-B41F-5A6B72103240}" type="slidenum">
               <a:rPr lang="en-US" smtClean="0"/>
               <a:pPr/>
-              <a:t>‹#›</a:t>
+              <a:t>‹nr.›</a:t>
             </a:fld>
             <a:endParaRPr lang="en-US"/>
           </a:p>
@@ -1622,7 +1622,7 @@
             <a:fld id="{6A504196-4937-5640-86EA-1E28139B6342}" type="datetimeFigureOut">
               <a:rPr lang="en-US" smtClean="0"/>
               <a:pPr/>
-              <a:t>10/15/13</a:t>
+              <a:t>10/17/13</a:t>
             </a:fld>
             <a:endParaRPr lang="en-US"/>
           </a:p>
@@ -1665,7 +1665,7 @@
             <a:fld id="{5605EB78-CF4B-0945-B41F-5A6B72103240}" type="slidenum">
               <a:rPr lang="en-US" smtClean="0"/>
               <a:pPr/>
-              <a:t>‹#›</a:t>
+              <a:t>‹nr.›</a:t>
             </a:fld>
             <a:endParaRPr lang="en-US"/>
           </a:p>
@@ -1907,7 +1907,7 @@
             <a:fld id="{6A504196-4937-5640-86EA-1E28139B6342}" type="datetimeFigureOut">
               <a:rPr lang="en-US" smtClean="0"/>
               <a:pPr/>
-              <a:t>10/15/13</a:t>
+              <a:t>10/17/13</a:t>
             </a:fld>
             <a:endParaRPr lang="en-US"/>
           </a:p>
@@ -1950,7 +1950,7 @@
             <a:fld id="{5605EB78-CF4B-0945-B41F-5A6B72103240}" type="slidenum">
               <a:rPr lang="en-US" smtClean="0"/>
               <a:pPr/>
-              <a:t>‹#›</a:t>
+              <a:t>‹nr.›</a:t>
             </a:fld>
             <a:endParaRPr lang="en-US"/>
           </a:p>
@@ -2326,7 +2326,7 @@
             <a:fld id="{6A504196-4937-5640-86EA-1E28139B6342}" type="datetimeFigureOut">
               <a:rPr lang="en-US" smtClean="0"/>
               <a:pPr/>
-              <a:t>10/15/13</a:t>
+              <a:t>10/17/13</a:t>
             </a:fld>
             <a:endParaRPr lang="en-US"/>
           </a:p>
@@ -2369,7 +2369,7 @@
             <a:fld id="{5605EB78-CF4B-0945-B41F-5A6B72103240}" type="slidenum">
               <a:rPr lang="en-US" smtClean="0"/>
               <a:pPr/>
-              <a:t>‹#›</a:t>
+              <a:t>‹nr.›</a:t>
             </a:fld>
             <a:endParaRPr lang="en-US"/>
           </a:p>
@@ -2441,7 +2441,7 @@
             <a:fld id="{6A504196-4937-5640-86EA-1E28139B6342}" type="datetimeFigureOut">
               <a:rPr lang="en-US" smtClean="0"/>
               <a:pPr/>
-              <a:t>10/15/13</a:t>
+              <a:t>10/17/13</a:t>
             </a:fld>
             <a:endParaRPr lang="en-US"/>
           </a:p>
@@ -2484,7 +2484,7 @@
             <a:fld id="{5605EB78-CF4B-0945-B41F-5A6B72103240}" type="slidenum">
               <a:rPr lang="en-US" smtClean="0"/>
               <a:pPr/>
-              <a:t>‹#›</a:t>
+              <a:t>‹nr.›</a:t>
             </a:fld>
             <a:endParaRPr lang="en-US"/>
           </a:p>
@@ -2533,7 +2533,7 @@
             <a:fld id="{6A504196-4937-5640-86EA-1E28139B6342}" type="datetimeFigureOut">
               <a:rPr lang="en-US" smtClean="0"/>
               <a:pPr/>
-              <a:t>10/15/13</a:t>
+              <a:t>10/17/13</a:t>
             </a:fld>
             <a:endParaRPr lang="en-US"/>
           </a:p>
@@ -2576,7 +2576,7 @@
             <a:fld id="{5605EB78-CF4B-0945-B41F-5A6B72103240}" type="slidenum">
               <a:rPr lang="en-US" smtClean="0"/>
               <a:pPr/>
-              <a:t>‹#›</a:t>
+              <a:t>‹nr.›</a:t>
             </a:fld>
             <a:endParaRPr lang="en-US"/>
           </a:p>
@@ -2807,7 +2807,7 @@
             <a:fld id="{6A504196-4937-5640-86EA-1E28139B6342}" type="datetimeFigureOut">
               <a:rPr lang="en-US" smtClean="0"/>
               <a:pPr/>
-              <a:t>10/15/13</a:t>
+              <a:t>10/17/13</a:t>
             </a:fld>
             <a:endParaRPr lang="en-US"/>
           </a:p>
@@ -2850,7 +2850,7 @@
             <a:fld id="{5605EB78-CF4B-0945-B41F-5A6B72103240}" type="slidenum">
               <a:rPr lang="en-US" smtClean="0"/>
               <a:pPr/>
-              <a:t>‹#›</a:t>
+              <a:t>‹nr.›</a:t>
             </a:fld>
             <a:endParaRPr lang="en-US"/>
           </a:p>
@@ -3057,7 +3057,7 @@
             <a:fld id="{6A504196-4937-5640-86EA-1E28139B6342}" type="datetimeFigureOut">
               <a:rPr lang="en-US" smtClean="0"/>
               <a:pPr/>
-              <a:t>10/15/13</a:t>
+              <a:t>10/17/13</a:t>
             </a:fld>
             <a:endParaRPr lang="en-US"/>
           </a:p>
@@ -3100,7 +3100,7 @@
             <a:fld id="{5605EB78-CF4B-0945-B41F-5A6B72103240}" type="slidenum">
               <a:rPr lang="en-US" smtClean="0"/>
               <a:pPr/>
-              <a:t>‹#›</a:t>
+              <a:t>‹nr.›</a:t>
             </a:fld>
             <a:endParaRPr lang="en-US"/>
           </a:p>
@@ -3267,7 +3267,7 @@
             <a:fld id="{6A504196-4937-5640-86EA-1E28139B6342}" type="datetimeFigureOut">
               <a:rPr lang="en-US" smtClean="0"/>
               <a:pPr/>
-              <a:t>10/15/13</a:t>
+              <a:t>10/17/13</a:t>
             </a:fld>
             <a:endParaRPr lang="en-US"/>
           </a:p>
@@ -3346,7 +3346,7 @@
             <a:fld id="{5605EB78-CF4B-0945-B41F-5A6B72103240}" type="slidenum">
               <a:rPr lang="en-US" smtClean="0"/>
               <a:pPr/>
-              <a:t>‹#›</a:t>
+              <a:t>‹nr.›</a:t>
             </a:fld>
             <a:endParaRPr lang="en-US"/>
           </a:p>
@@ -3676,10 +3676,6 @@
           <a:bodyPr/>
           <a:lstStyle/>
           <a:p>
-            <a:r>
-              <a:rPr lang="en-US" dirty="0" smtClean="0"/>
-              <a:t>11 September 2012, 14.00-16.00</a:t>
-            </a:r>
             <a:endParaRPr lang="en-US" dirty="0"/>
           </a:p>
         </p:txBody>
@@ -4156,15 +4152,7 @@
             </a:pPr>
             <a:r>
               <a:rPr lang="en-US" sz="1400" dirty="0" smtClean="0"/>
-              <a:t>Rename that directory to ’</a:t>
-            </a:r>
-            <a:r>
-              <a:rPr lang="en-US" sz="1400" dirty="0" smtClean="0"/>
-              <a:t>arangs13' </a:t>
-            </a:r>
-            <a:r>
-              <a:rPr lang="en-US" sz="1400" dirty="0" smtClean="0"/>
-              <a:t>from the </a:t>
+              <a:t>Rename that directory to ’arangs13' from the </a:t>
             </a:r>
             <a:r>
               <a:rPr lang="en-US" sz="1400" dirty="0" err="1" smtClean="0"/>
@@ -5657,6 +5645,11 @@
           </p:cNvGraphicFramePr>
           <p:nvPr>
             <p:ph sz="quarter" idx="4"/>
+            <p:extLst>
+              <p:ext uri="{D42A27DB-BD31-4B8C-83A1-F6EECF244321}">
+                <p14:modId xmlns:p14="http://schemas.microsoft.com/office/powerpoint/2010/main" val="1810330279"/>
+              </p:ext>
+            </p:extLst>
           </p:nvPr>
         </p:nvGraphicFramePr>
         <p:xfrm>
@@ -5774,8 +5767,9 @@
                       </a:pPr>
                       <a:r>
                         <a:rPr lang="en-US" dirty="0" smtClean="0"/>
-                        <a:t>head</a:t>
-                      </a:r>
+                        <a:t>head/tail</a:t>
+                      </a:r>
+                      <a:endParaRPr lang="en-US" dirty="0" smtClean="0"/>
                     </a:p>
                   </a:txBody>
                   <a:tcPr/>
@@ -5804,7 +5798,15 @@
                       </a:pPr>
                       <a:r>
                         <a:rPr lang="en-US" dirty="0" smtClean="0"/>
-                        <a:t>View first lines of file</a:t>
+                        <a:t>View </a:t>
+                      </a:r>
+                      <a:r>
+                        <a:rPr lang="en-US" dirty="0" smtClean="0"/>
+                        <a:t>first/last </a:t>
+                      </a:r>
+                      <a:r>
+                        <a:rPr lang="en-US" dirty="0" smtClean="0"/>
+                        <a:t>lines of file</a:t>
                       </a:r>
                     </a:p>
                   </a:txBody>
@@ -5836,8 +5838,9 @@
                       </a:pPr>
                       <a:r>
                         <a:rPr lang="en-US" dirty="0" smtClean="0"/>
-                        <a:t>tail</a:t>
-                      </a:r>
+                        <a:t>cut</a:t>
+                      </a:r>
+                      <a:endParaRPr lang="en-US" dirty="0" smtClean="0"/>
                     </a:p>
                   </a:txBody>
                   <a:tcPr/>
@@ -5866,8 +5869,13 @@
                       </a:pPr>
                       <a:r>
                         <a:rPr lang="en-US" dirty="0" smtClean="0"/>
-                        <a:t>View last lines of file</a:t>
-                      </a:r>
+                        <a:t>Extract columns</a:t>
+                      </a:r>
+                      <a:r>
+                        <a:rPr lang="en-US" baseline="0" dirty="0" smtClean="0"/>
+                        <a:t> from table</a:t>
+                      </a:r>
+                      <a:endParaRPr lang="en-US" dirty="0" smtClean="0"/>
                     </a:p>
                   </a:txBody>
                   <a:tcPr/>
@@ -6154,8 +6162,9 @@
                       </a:pPr>
                       <a:r>
                         <a:rPr lang="en-US" dirty="0" smtClean="0"/>
-                        <a:t>cat</a:t>
-                      </a:r>
+                        <a:t>(z)cat</a:t>
+                      </a:r>
+                      <a:endParaRPr lang="en-US" dirty="0" smtClean="0"/>
                     </a:p>
                   </a:txBody>
                   <a:tcPr/>
@@ -6184,7 +6193,23 @@
                       </a:pPr>
                       <a:r>
                         <a:rPr lang="en-US" dirty="0" smtClean="0"/>
-                        <a:t>Print file contents</a:t>
+                        <a:t>Print </a:t>
+                      </a:r>
+                      <a:r>
+                        <a:rPr lang="en-US" dirty="0" smtClean="0"/>
+                        <a:t>(</a:t>
+                      </a:r>
+                      <a:r>
+                        <a:rPr lang="en-US" dirty="0" err="1" smtClean="0"/>
+                        <a:t>gzipped</a:t>
+                      </a:r>
+                      <a:r>
+                        <a:rPr lang="en-US" dirty="0" smtClean="0"/>
+                        <a:t>) file </a:t>
+                      </a:r>
+                      <a:r>
+                        <a:rPr lang="en-US" dirty="0" smtClean="0"/>
+                        <a:t>contents</a:t>
                       </a:r>
                     </a:p>
                   </a:txBody>
@@ -6279,7 +6304,11 @@
                       </a:pPr>
                       <a:r>
                         <a:rPr lang="en-US" dirty="0" err="1" smtClean="0"/>
-                        <a:t>awk</a:t>
+                        <a:t>perl</a:t>
+                      </a:r>
+                      <a:r>
+                        <a:rPr lang="en-US" dirty="0" smtClean="0"/>
+                        <a:t>/…</a:t>
                       </a:r>
                       <a:endParaRPr lang="en-US" dirty="0" smtClean="0"/>
                     </a:p>
@@ -6310,8 +6339,13 @@
                       </a:pPr>
                       <a:r>
                         <a:rPr lang="en-US" dirty="0" smtClean="0"/>
-                        <a:t>Tabular data processing</a:t>
-                      </a:r>
+                        <a:t>Interpreted</a:t>
+                      </a:r>
+                      <a:r>
+                        <a:rPr lang="en-US" baseline="0" dirty="0" smtClean="0"/>
+                        <a:t> programming</a:t>
+                      </a:r>
+                      <a:endParaRPr lang="en-US" dirty="0" smtClean="0"/>
                     </a:p>
                   </a:txBody>
                   <a:tcPr/>

</xml_diff>

<commit_message>
this should be the correct merge (famous last words)
</commit_message>
<xml_diff>
--- a/doc/slides/day1/session3/UNIXCLI.pptx
+++ b/doc/slides/day1/session3/UNIXCLI.pptx
@@ -4030,7 +4030,15 @@
             </a:pPr>
             <a:r>
               <a:rPr lang="en-US" sz="1400" dirty="0" smtClean="0"/>
-              <a:t>Print out all of the environment variables currently set.</a:t>
+              <a:t>Print out all of the environment variables currently set using the ‘</a:t>
+            </a:r>
+            <a:r>
+              <a:rPr lang="en-US" sz="1400" dirty="0" err="1" smtClean="0"/>
+              <a:t>env</a:t>
+            </a:r>
+            <a:r>
+              <a:rPr lang="en-US" sz="1400" dirty="0" smtClean="0"/>
+              <a:t>’ command.</a:t>
             </a:r>
           </a:p>
           <a:p>
@@ -4050,7 +4058,31 @@
             </a:pPr>
             <a:r>
               <a:rPr lang="en-US" sz="1400" dirty="0" smtClean="0"/>
-              <a:t>Print out your PATH environment variable.</a:t>
+              <a:t>Print out your PATH environment variable</a:t>
+            </a:r>
+            <a:r>
+              <a:rPr lang="en-US" sz="1400" dirty="0"/>
+              <a:t> </a:t>
+            </a:r>
+            <a:r>
+              <a:rPr lang="en-US" sz="1400" dirty="0" smtClean="0"/>
+              <a:t>using ‘echo’.  Try piping the output of </a:t>
+            </a:r>
+            <a:r>
+              <a:rPr lang="en-US" sz="1400" dirty="0" err="1" smtClean="0"/>
+              <a:t>env</a:t>
+            </a:r>
+            <a:r>
+              <a:rPr lang="en-US" sz="1400" dirty="0" smtClean="0"/>
+              <a:t> to </a:t>
+            </a:r>
+            <a:r>
+              <a:rPr lang="en-US" sz="1400" dirty="0" err="1" smtClean="0"/>
+              <a:t>grep</a:t>
+            </a:r>
+            <a:r>
+              <a:rPr lang="en-US" sz="1400" dirty="0" smtClean="0"/>
+              <a:t>.</a:t>
             </a:r>
           </a:p>
           <a:p>
@@ -4178,7 +4210,7 @@
             </a:r>
             <a:r>
               <a:rPr lang="en-US" sz="1400" dirty="0" smtClean="0"/>
-              <a:t> interpreter executable.</a:t>
+              <a:t> interpreter executable using the ‘which’ command.</a:t>
             </a:r>
           </a:p>
           <a:p>
@@ -4292,7 +4324,7 @@
             </a:r>
             <a:r>
               <a:rPr lang="en-US" sz="1400" dirty="0" smtClean="0"/>
-              <a:t>.</a:t>
+              <a:t> using the ‘man’ command.</a:t>
             </a:r>
           </a:p>
           <a:p>
@@ -5647,7 +5679,7 @@
             <p:ph sz="quarter" idx="4"/>
             <p:extLst>
               <p:ext uri="{D42A27DB-BD31-4B8C-83A1-F6EECF244321}">
-                <p14:modId xmlns:p14="http://schemas.microsoft.com/office/powerpoint/2010/main" val="1810330279"/>
+                <p14:modId xmlns:p14="http://schemas.microsoft.com/office/powerpoint/2010/main" val="2218428351"/>
               </p:ext>
             </p:extLst>
           </p:nvPr>
@@ -5704,7 +5736,7 @@
                     <a:p>
                       <a:r>
                         <a:rPr lang="en-US" dirty="0" smtClean="0"/>
-                        <a:t>more</a:t>
+                        <a:t>more/less</a:t>
                       </a:r>
                       <a:endParaRPr lang="en-US" dirty="0"/>
                     </a:p>
@@ -5869,11 +5901,7 @@
                       </a:pPr>
                       <a:r>
                         <a:rPr lang="en-US" dirty="0" smtClean="0"/>
-                        <a:t>Extract columns</a:t>
-                      </a:r>
-                      <a:r>
-                        <a:rPr lang="en-US" baseline="0" dirty="0" smtClean="0"/>
-                        <a:t> from table</a:t>
+                        <a:t>Extract columns from table</a:t>
                       </a:r>
                       <a:endParaRPr lang="en-US" dirty="0" smtClean="0"/>
                     </a:p>
@@ -6193,23 +6221,11 @@
                       </a:pPr>
                       <a:r>
                         <a:rPr lang="en-US" dirty="0" smtClean="0"/>
-                        <a:t>Print </a:t>
+                        <a:t>Print (zipped) </a:t>
                       </a:r>
                       <a:r>
                         <a:rPr lang="en-US" dirty="0" smtClean="0"/>
-                        <a:t>(</a:t>
-                      </a:r>
-                      <a:r>
-                        <a:rPr lang="en-US" dirty="0" err="1" smtClean="0"/>
-                        <a:t>gzipped</a:t>
-                      </a:r>
-                      <a:r>
-                        <a:rPr lang="en-US" dirty="0" smtClean="0"/>
-                        <a:t>) file </a:t>
-                      </a:r>
-                      <a:r>
-                        <a:rPr lang="en-US" dirty="0" smtClean="0"/>
-                        <a:t>contents</a:t>
+                        <a:t>file contents</a:t>
                       </a:r>
                     </a:p>
                   </a:txBody>
@@ -6308,7 +6324,7 @@
                       </a:r>
                       <a:r>
                         <a:rPr lang="en-US" dirty="0" smtClean="0"/>
-                        <a:t>/…</a:t>
+                        <a:t>/R/…</a:t>
                       </a:r>
                       <a:endParaRPr lang="en-US" dirty="0" smtClean="0"/>
                     </a:p>
@@ -6339,11 +6355,7 @@
                       </a:pPr>
                       <a:r>
                         <a:rPr lang="en-US" dirty="0" smtClean="0"/>
-                        <a:t>Interpreted</a:t>
-                      </a:r>
-                      <a:r>
-                        <a:rPr lang="en-US" baseline="0" dirty="0" smtClean="0"/>
-                        <a:t> programming</a:t>
+                        <a:t>Interpreters</a:t>
                       </a:r>
                       <a:endParaRPr lang="en-US" dirty="0" smtClean="0"/>
                     </a:p>
@@ -6670,11 +6682,16 @@
           </p:cNvGraphicFramePr>
           <p:nvPr>
             <p:ph sz="half" idx="2"/>
+            <p:extLst>
+              <p:ext uri="{D42A27DB-BD31-4B8C-83A1-F6EECF244321}">
+                <p14:modId xmlns:p14="http://schemas.microsoft.com/office/powerpoint/2010/main" val="3155799098"/>
+              </p:ext>
+            </p:extLst>
           </p:nvPr>
         </p:nvGraphicFramePr>
         <p:xfrm>
           <a:off x="4267200" y="1874837"/>
-          <a:ext cx="4419600" cy="3606800"/>
+          <a:ext cx="4419600" cy="3337560"/>
         </p:xfrm>
         <a:graphic>
           <a:graphicData uri="http://schemas.openxmlformats.org/drawingml/2006/table">
@@ -6683,8 +6700,8 @@
                 <a:tableStyleId>{5C22544A-7EE6-4342-B048-85BDC9FD1C3A}</a:tableStyleId>
               </a:tblPr>
               <a:tblGrid>
-                <a:gridCol w="1447800"/>
-                <a:gridCol w="2971800"/>
+                <a:gridCol w="1528936"/>
+                <a:gridCol w="2890664"/>
               </a:tblGrid>
               <a:tr h="370840">
                 <a:tc>

</xml_diff>

<commit_message>
tweaked the table of commands, with a nod to man
</commit_message>
<xml_diff>
--- a/doc/slides/day1/session3/UNIXCLI.pptx
+++ b/doc/slides/day1/session3/UNIXCLI.pptx
@@ -365,7 +365,7 @@
             <a:fld id="{9DBAAB30-7614-204B-A67D-41A54EA59D42}" type="slidenum">
               <a:rPr lang="en-US" smtClean="0"/>
               <a:pPr/>
-              <a:t>‹nr.›</a:t>
+              <a:t>‹#›</a:t>
             </a:fld>
             <a:endParaRPr lang="en-US"/>
           </a:p>
@@ -911,7 +911,7 @@
             <a:fld id="{5605EB78-CF4B-0945-B41F-5A6B72103240}" type="slidenum">
               <a:rPr lang="en-US" smtClean="0"/>
               <a:pPr/>
-              <a:t>‹nr.›</a:t>
+              <a:t>‹#›</a:t>
             </a:fld>
             <a:endParaRPr lang="en-US"/>
           </a:p>
@@ -1078,7 +1078,7 @@
             <a:fld id="{5605EB78-CF4B-0945-B41F-5A6B72103240}" type="slidenum">
               <a:rPr lang="en-US" smtClean="0"/>
               <a:pPr/>
-              <a:t>‹nr.›</a:t>
+              <a:t>‹#›</a:t>
             </a:fld>
             <a:endParaRPr lang="en-US"/>
           </a:p>
@@ -1255,7 +1255,7 @@
             <a:fld id="{5605EB78-CF4B-0945-B41F-5A6B72103240}" type="slidenum">
               <a:rPr lang="en-US" smtClean="0"/>
               <a:pPr/>
-              <a:t>‹nr.›</a:t>
+              <a:t>‹#›</a:t>
             </a:fld>
             <a:endParaRPr lang="en-US"/>
           </a:p>
@@ -1422,7 +1422,7 @@
             <a:fld id="{5605EB78-CF4B-0945-B41F-5A6B72103240}" type="slidenum">
               <a:rPr lang="en-US" smtClean="0"/>
               <a:pPr/>
-              <a:t>‹nr.›</a:t>
+              <a:t>‹#›</a:t>
             </a:fld>
             <a:endParaRPr lang="en-US"/>
           </a:p>
@@ -1665,7 +1665,7 @@
             <a:fld id="{5605EB78-CF4B-0945-B41F-5A6B72103240}" type="slidenum">
               <a:rPr lang="en-US" smtClean="0"/>
               <a:pPr/>
-              <a:t>‹nr.›</a:t>
+              <a:t>‹#›</a:t>
             </a:fld>
             <a:endParaRPr lang="en-US"/>
           </a:p>
@@ -1950,7 +1950,7 @@
             <a:fld id="{5605EB78-CF4B-0945-B41F-5A6B72103240}" type="slidenum">
               <a:rPr lang="en-US" smtClean="0"/>
               <a:pPr/>
-              <a:t>‹nr.›</a:t>
+              <a:t>‹#›</a:t>
             </a:fld>
             <a:endParaRPr lang="en-US"/>
           </a:p>
@@ -2369,7 +2369,7 @@
             <a:fld id="{5605EB78-CF4B-0945-B41F-5A6B72103240}" type="slidenum">
               <a:rPr lang="en-US" smtClean="0"/>
               <a:pPr/>
-              <a:t>‹nr.›</a:t>
+              <a:t>‹#›</a:t>
             </a:fld>
             <a:endParaRPr lang="en-US"/>
           </a:p>
@@ -2484,7 +2484,7 @@
             <a:fld id="{5605EB78-CF4B-0945-B41F-5A6B72103240}" type="slidenum">
               <a:rPr lang="en-US" smtClean="0"/>
               <a:pPr/>
-              <a:t>‹nr.›</a:t>
+              <a:t>‹#›</a:t>
             </a:fld>
             <a:endParaRPr lang="en-US"/>
           </a:p>
@@ -2576,7 +2576,7 @@
             <a:fld id="{5605EB78-CF4B-0945-B41F-5A6B72103240}" type="slidenum">
               <a:rPr lang="en-US" smtClean="0"/>
               <a:pPr/>
-              <a:t>‹nr.›</a:t>
+              <a:t>‹#›</a:t>
             </a:fld>
             <a:endParaRPr lang="en-US"/>
           </a:p>
@@ -2850,7 +2850,7 @@
             <a:fld id="{5605EB78-CF4B-0945-B41F-5A6B72103240}" type="slidenum">
               <a:rPr lang="en-US" smtClean="0"/>
               <a:pPr/>
-              <a:t>‹nr.›</a:t>
+              <a:t>‹#›</a:t>
             </a:fld>
             <a:endParaRPr lang="en-US"/>
           </a:p>
@@ -3100,7 +3100,7 @@
             <a:fld id="{5605EB78-CF4B-0945-B41F-5A6B72103240}" type="slidenum">
               <a:rPr lang="en-US" smtClean="0"/>
               <a:pPr/>
-              <a:t>‹nr.›</a:t>
+              <a:t>‹#›</a:t>
             </a:fld>
             <a:endParaRPr lang="en-US"/>
           </a:p>
@@ -3346,7 +3346,7 @@
             <a:fld id="{5605EB78-CF4B-0945-B41F-5A6B72103240}" type="slidenum">
               <a:rPr lang="en-US" smtClean="0"/>
               <a:pPr/>
-              <a:t>‹nr.›</a:t>
+              <a:t>‹#›</a:t>
             </a:fld>
             <a:endParaRPr lang="en-US"/>
           </a:p>
@@ -5242,14 +5242,25 @@
             <p:ph type="title"/>
           </p:nvPr>
         </p:nvSpPr>
-        <p:spPr/>
-        <p:txBody>
-          <a:bodyPr/>
+        <p:spPr>
+          <a:xfrm>
+            <a:off x="457200" y="274638"/>
+            <a:ext cx="8229600" cy="634082"/>
+          </a:xfrm>
+        </p:spPr>
+        <p:txBody>
+          <a:bodyPr>
+            <a:normAutofit fontScale="90000"/>
+          </a:bodyPr>
           <a:lstStyle/>
           <a:p>
             <a:r>
-              <a:rPr lang="en-US" smtClean="0"/>
-              <a:t>Commonly-used CLI commands</a:t>
+              <a:rPr lang="en-US" dirty="0" smtClean="0"/>
+              <a:t>Commonly-used CLI </a:t>
+            </a:r>
+            <a:r>
+              <a:rPr lang="en-US" dirty="0" smtClean="0"/>
+              <a:t>commands</a:t>
             </a:r>
             <a:endParaRPr lang="en-US" dirty="0"/>
           </a:p>
@@ -5291,11 +5302,16 @@
           </p:cNvGraphicFramePr>
           <p:nvPr>
             <p:ph sz="half" idx="2"/>
+            <p:extLst>
+              <p:ext uri="{D42A27DB-BD31-4B8C-83A1-F6EECF244321}">
+                <p14:modId xmlns:p14="http://schemas.microsoft.com/office/powerpoint/2010/main" val="629020571"/>
+              </p:ext>
+            </p:extLst>
           </p:nvPr>
         </p:nvGraphicFramePr>
         <p:xfrm>
           <a:off x="457200" y="1706562"/>
-          <a:ext cx="4040187" cy="4079240"/>
+          <a:ext cx="4040187" cy="4663440"/>
         </p:xfrm>
         <a:graphic>
           <a:graphicData uri="http://schemas.openxmlformats.org/drawingml/2006/table">
@@ -5307,7 +5323,7 @@
                 <a:gridCol w="1372139"/>
                 <a:gridCol w="2668048"/>
               </a:tblGrid>
-              <a:tr h="370840">
+              <a:tr h="352587">
                 <a:tc>
                   <a:txBody>
                     <a:bodyPr/>
@@ -5337,7 +5353,7 @@
                   <a:tcPr marL="91476" marR="91476"/>
                 </a:tc>
               </a:tr>
-              <a:tr h="370840">
+              <a:tr h="352587">
                 <a:tc>
                   <a:txBody>
                     <a:bodyPr/>
@@ -5367,7 +5383,7 @@
                   <a:tcPr marL="91476" marR="91476"/>
                 </a:tc>
               </a:tr>
-              <a:tr h="370840">
+              <a:tr h="352587">
                 <a:tc>
                   <a:txBody>
                     <a:bodyPr/>
@@ -5397,7 +5413,7 @@
                   <a:tcPr marL="91476" marR="91476"/>
                 </a:tc>
               </a:tr>
-              <a:tr h="370840">
+              <a:tr h="352587">
                 <a:tc>
                   <a:txBody>
                     <a:bodyPr/>
@@ -5427,7 +5443,7 @@
                   <a:tcPr marL="91476" marR="91476"/>
                 </a:tc>
               </a:tr>
-              <a:tr h="370840">
+              <a:tr h="352587">
                 <a:tc>
                   <a:txBody>
                     <a:bodyPr/>
@@ -5457,7 +5473,7 @@
                   <a:tcPr marL="91476" marR="91476"/>
                 </a:tc>
               </a:tr>
-              <a:tr h="370840">
+              <a:tr h="352587">
                 <a:tc>
                   <a:txBody>
                     <a:bodyPr/>
@@ -5487,7 +5503,7 @@
                   <a:tcPr marL="91476" marR="91476"/>
                 </a:tc>
               </a:tr>
-              <a:tr h="370840">
+              <a:tr h="352587">
                 <a:tc>
                   <a:txBody>
                     <a:bodyPr/>
@@ -5517,7 +5533,7 @@
                   <a:tcPr marL="91476" marR="91476"/>
                 </a:tc>
               </a:tr>
-              <a:tr h="370840">
+              <a:tr h="352587">
                 <a:tc>
                   <a:txBody>
                     <a:bodyPr/>
@@ -5547,7 +5563,7 @@
                   <a:tcPr marL="91476" marR="91476"/>
                 </a:tc>
               </a:tr>
-              <a:tr h="370840">
+              <a:tr h="352587">
                 <a:tc>
                   <a:txBody>
                     <a:bodyPr/>
@@ -5577,7 +5593,7 @@
                   <a:tcPr marL="91476" marR="91476"/>
                 </a:tc>
               </a:tr>
-              <a:tr h="370840">
+              <a:tr h="352587">
                 <a:tc>
                   <a:txBody>
                     <a:bodyPr/>
@@ -5607,7 +5623,7 @@
                   <a:tcPr marL="91476" marR="91476"/>
                 </a:tc>
               </a:tr>
-              <a:tr h="370840">
+              <a:tr h="352587">
                 <a:tc>
                   <a:txBody>
                     <a:bodyPr/>
@@ -5630,6 +5646,40 @@
                       <a:r>
                         <a:rPr lang="en-US" dirty="0" smtClean="0"/>
                         <a:t>Change owner</a:t>
+                      </a:r>
+                      <a:endParaRPr lang="en-US" dirty="0"/>
+                    </a:p>
+                  </a:txBody>
+                  <a:tcPr marL="91476" marR="91476"/>
+                </a:tc>
+              </a:tr>
+              <a:tr h="617028">
+                <a:tc>
+                  <a:txBody>
+                    <a:bodyPr/>
+                    <a:lstStyle/>
+                    <a:p>
+                      <a:r>
+                        <a:rPr lang="en-US" dirty="0" smtClean="0"/>
+                        <a:t>md5sum/sha1sum</a:t>
+                      </a:r>
+                      <a:endParaRPr lang="en-US" dirty="0"/>
+                    </a:p>
+                  </a:txBody>
+                  <a:tcPr marL="91476" marR="91476"/>
+                </a:tc>
+                <a:tc>
+                  <a:txBody>
+                    <a:bodyPr/>
+                    <a:lstStyle/>
+                    <a:p>
+                      <a:r>
+                        <a:rPr lang="en-US" dirty="0" smtClean="0"/>
+                        <a:t>Print unique </a:t>
+                      </a:r>
+                      <a:r>
+                        <a:rPr lang="en-US" dirty="0" err="1" smtClean="0"/>
+                        <a:t>hashsum</a:t>
                       </a:r>
                       <a:endParaRPr lang="en-US" dirty="0"/>
                     </a:p>
@@ -5801,7 +5851,6 @@
                         <a:rPr lang="en-US" dirty="0" smtClean="0"/>
                         <a:t>head/tail</a:t>
                       </a:r>
-                      <a:endParaRPr lang="en-US" dirty="0" smtClean="0"/>
                     </a:p>
                   </a:txBody>
                   <a:tcPr/>
@@ -5830,15 +5879,7 @@
                       </a:pPr>
                       <a:r>
                         <a:rPr lang="en-US" dirty="0" smtClean="0"/>
-                        <a:t>View </a:t>
-                      </a:r>
-                      <a:r>
-                        <a:rPr lang="en-US" dirty="0" smtClean="0"/>
-                        <a:t>first/last </a:t>
-                      </a:r>
-                      <a:r>
-                        <a:rPr lang="en-US" dirty="0" smtClean="0"/>
-                        <a:t>lines of file</a:t>
+                        <a:t>View first/last lines of file</a:t>
                       </a:r>
                     </a:p>
                   </a:txBody>
@@ -5872,7 +5913,6 @@
                         <a:rPr lang="en-US" dirty="0" smtClean="0"/>
                         <a:t>cut</a:t>
                       </a:r>
-                      <a:endParaRPr lang="en-US" dirty="0" smtClean="0"/>
                     </a:p>
                   </a:txBody>
                   <a:tcPr/>
@@ -5903,7 +5943,6 @@
                         <a:rPr lang="en-US" dirty="0" smtClean="0"/>
                         <a:t>Extract columns from table</a:t>
                       </a:r>
-                      <a:endParaRPr lang="en-US" dirty="0" smtClean="0"/>
                     </a:p>
                   </a:txBody>
                   <a:tcPr/>
@@ -6192,7 +6231,6 @@
                         <a:rPr lang="en-US" dirty="0" smtClean="0"/>
                         <a:t>(z)cat</a:t>
                       </a:r>
-                      <a:endParaRPr lang="en-US" dirty="0" smtClean="0"/>
                     </a:p>
                   </a:txBody>
                   <a:tcPr/>
@@ -6221,11 +6259,7 @@
                       </a:pPr>
                       <a:r>
                         <a:rPr lang="en-US" dirty="0" smtClean="0"/>
-                        <a:t>Print (zipped) </a:t>
-                      </a:r>
-                      <a:r>
-                        <a:rPr lang="en-US" dirty="0" smtClean="0"/>
-                        <a:t>file contents</a:t>
+                        <a:t>Print (zipped) file contents</a:t>
                       </a:r>
                     </a:p>
                   </a:txBody>
@@ -6326,7 +6360,6 @@
                         <a:rPr lang="en-US" dirty="0" smtClean="0"/>
                         <a:t>/R/…</a:t>
                       </a:r>
-                      <a:endParaRPr lang="en-US" dirty="0" smtClean="0"/>
                     </a:p>
                   </a:txBody>
                   <a:tcPr/>
@@ -6357,7 +6390,6 @@
                         <a:rPr lang="en-US" dirty="0" smtClean="0"/>
                         <a:t>Interpreters</a:t>
                       </a:r>
-                      <a:endParaRPr lang="en-US" dirty="0" smtClean="0"/>
                     </a:p>
                   </a:txBody>
                   <a:tcPr/>
@@ -6375,7 +6407,7 @@
         </p:nvSpPr>
         <p:spPr>
           <a:xfrm>
-            <a:off x="457200" y="5943600"/>
+            <a:off x="457200" y="6307826"/>
             <a:ext cx="8131140" cy="369332"/>
           </a:xfrm>
           <a:prstGeom prst="rect">
@@ -6392,6 +6424,36 @@
             <a:r>
               <a:rPr lang="en-US" dirty="0" smtClean="0"/>
               <a:t>Commands are binaries that are executed by typing their names on a terminal shell $</a:t>
+            </a:r>
+            <a:endParaRPr lang="en-US" dirty="0"/>
+          </a:p>
+        </p:txBody>
+      </p:sp>
+      <p:sp>
+        <p:nvSpPr>
+          <p:cNvPr id="4" name="TextBox 3"/>
+          <p:cNvSpPr txBox="1"/>
+          <p:nvPr/>
+        </p:nvSpPr>
+        <p:spPr>
+          <a:xfrm>
+            <a:off x="1331640" y="894950"/>
+            <a:ext cx="4104456" cy="369332"/>
+          </a:xfrm>
+          <a:prstGeom prst="rect">
+            <a:avLst/>
+          </a:prstGeom>
+          <a:noFill/>
+        </p:spPr>
+        <p:txBody>
+          <a:bodyPr wrap="square" rtlCol="0">
+            <a:spAutoFit/>
+          </a:bodyPr>
+          <a:lstStyle/>
+          <a:p>
+            <a:r>
+              <a:rPr lang="en-US" dirty="0" smtClean="0"/>
+              <a:t>(man $command for more information)</a:t>
             </a:r>
             <a:endParaRPr lang="en-US" dirty="0"/>
           </a:p>

</xml_diff>

<commit_message>
removed editing of .bashrc from exercise
</commit_message>
<xml_diff>
--- a/doc/slides/day1/session3/UNIXCLI.pptx
+++ b/doc/slides/day1/session3/UNIXCLI.pptx
@@ -203,7 +203,7 @@
             <a:fld id="{212AA354-AE5B-9442-9520-E20E873FCE1D}" type="datetimeFigureOut">
               <a:rPr lang="en-US" smtClean="0"/>
               <a:pPr/>
-              <a:t>10/17/13</a:t>
+              <a:t>10/21/13</a:t>
             </a:fld>
             <a:endParaRPr lang="en-US"/>
           </a:p>
@@ -868,7 +868,7 @@
             <a:fld id="{6A504196-4937-5640-86EA-1E28139B6342}" type="datetimeFigureOut">
               <a:rPr lang="en-US" smtClean="0"/>
               <a:pPr/>
-              <a:t>10/17/13</a:t>
+              <a:t>10/21/13</a:t>
             </a:fld>
             <a:endParaRPr lang="en-US"/>
           </a:p>
@@ -1035,7 +1035,7 @@
             <a:fld id="{6A504196-4937-5640-86EA-1E28139B6342}" type="datetimeFigureOut">
               <a:rPr lang="en-US" smtClean="0"/>
               <a:pPr/>
-              <a:t>10/17/13</a:t>
+              <a:t>10/21/13</a:t>
             </a:fld>
             <a:endParaRPr lang="en-US"/>
           </a:p>
@@ -1212,7 +1212,7 @@
             <a:fld id="{6A504196-4937-5640-86EA-1E28139B6342}" type="datetimeFigureOut">
               <a:rPr lang="en-US" smtClean="0"/>
               <a:pPr/>
-              <a:t>10/17/13</a:t>
+              <a:t>10/21/13</a:t>
             </a:fld>
             <a:endParaRPr lang="en-US"/>
           </a:p>
@@ -1379,7 +1379,7 @@
             <a:fld id="{6A504196-4937-5640-86EA-1E28139B6342}" type="datetimeFigureOut">
               <a:rPr lang="en-US" smtClean="0"/>
               <a:pPr/>
-              <a:t>10/17/13</a:t>
+              <a:t>10/21/13</a:t>
             </a:fld>
             <a:endParaRPr lang="en-US"/>
           </a:p>
@@ -1622,7 +1622,7 @@
             <a:fld id="{6A504196-4937-5640-86EA-1E28139B6342}" type="datetimeFigureOut">
               <a:rPr lang="en-US" smtClean="0"/>
               <a:pPr/>
-              <a:t>10/17/13</a:t>
+              <a:t>10/21/13</a:t>
             </a:fld>
             <a:endParaRPr lang="en-US"/>
           </a:p>
@@ -1907,7 +1907,7 @@
             <a:fld id="{6A504196-4937-5640-86EA-1E28139B6342}" type="datetimeFigureOut">
               <a:rPr lang="en-US" smtClean="0"/>
               <a:pPr/>
-              <a:t>10/17/13</a:t>
+              <a:t>10/21/13</a:t>
             </a:fld>
             <a:endParaRPr lang="en-US"/>
           </a:p>
@@ -2326,7 +2326,7 @@
             <a:fld id="{6A504196-4937-5640-86EA-1E28139B6342}" type="datetimeFigureOut">
               <a:rPr lang="en-US" smtClean="0"/>
               <a:pPr/>
-              <a:t>10/17/13</a:t>
+              <a:t>10/21/13</a:t>
             </a:fld>
             <a:endParaRPr lang="en-US"/>
           </a:p>
@@ -2441,7 +2441,7 @@
             <a:fld id="{6A504196-4937-5640-86EA-1E28139B6342}" type="datetimeFigureOut">
               <a:rPr lang="en-US" smtClean="0"/>
               <a:pPr/>
-              <a:t>10/17/13</a:t>
+              <a:t>10/21/13</a:t>
             </a:fld>
             <a:endParaRPr lang="en-US"/>
           </a:p>
@@ -2533,7 +2533,7 @@
             <a:fld id="{6A504196-4937-5640-86EA-1E28139B6342}" type="datetimeFigureOut">
               <a:rPr lang="en-US" smtClean="0"/>
               <a:pPr/>
-              <a:t>10/17/13</a:t>
+              <a:t>10/21/13</a:t>
             </a:fld>
             <a:endParaRPr lang="en-US"/>
           </a:p>
@@ -2807,7 +2807,7 @@
             <a:fld id="{6A504196-4937-5640-86EA-1E28139B6342}" type="datetimeFigureOut">
               <a:rPr lang="en-US" smtClean="0"/>
               <a:pPr/>
-              <a:t>10/17/13</a:t>
+              <a:t>10/21/13</a:t>
             </a:fld>
             <a:endParaRPr lang="en-US"/>
           </a:p>
@@ -3057,7 +3057,7 @@
             <a:fld id="{6A504196-4937-5640-86EA-1E28139B6342}" type="datetimeFigureOut">
               <a:rPr lang="en-US" smtClean="0"/>
               <a:pPr/>
-              <a:t>10/17/13</a:t>
+              <a:t>10/21/13</a:t>
             </a:fld>
             <a:endParaRPr lang="en-US"/>
           </a:p>
@@ -3267,7 +3267,7 @@
             <a:fld id="{6A504196-4937-5640-86EA-1E28139B6342}" type="datetimeFigureOut">
               <a:rPr lang="en-US" smtClean="0"/>
               <a:pPr/>
-              <a:t>10/17/13</a:t>
+              <a:t>10/21/13</a:t>
             </a:fld>
             <a:endParaRPr lang="en-US"/>
           </a:p>
@@ -4130,17 +4130,11 @@
             </a:pPr>
             <a:r>
               <a:rPr lang="en-US" sz="1400" dirty="0" smtClean="0"/>
-              <a:t>Make it so that MYTEST2 is automatically set each time you login to your terminal application.</a:t>
-            </a:r>
-          </a:p>
-          <a:p>
-            <a:pPr marL="334800" indent="-334800">
-              <a:buFont typeface="+mj-lt"/>
-              <a:buAutoNum type="arabicPeriod"/>
-            </a:pPr>
+              <a:t>Find </a:t>
+            </a:r>
             <a:r>
               <a:rPr lang="en-US" sz="1400" dirty="0" smtClean="0"/>
-              <a:t>Find the largest file in your HOME directory (</a:t>
+              <a:t>the largest file in your HOME directory (</a:t>
             </a:r>
             <a:r>
               <a:rPr lang="en-US" sz="1400" dirty="0" err="1" smtClean="0"/>
@@ -5256,11 +5250,7 @@
           <a:p>
             <a:r>
               <a:rPr lang="en-US" dirty="0" smtClean="0"/>
-              <a:t>Commonly-used CLI </a:t>
-            </a:r>
-            <a:r>
-              <a:rPr lang="en-US" dirty="0" smtClean="0"/>
-              <a:t>commands</a:t>
+              <a:t>Commonly-used CLI commands</a:t>
             </a:r>
             <a:endParaRPr lang="en-US" dirty="0"/>
           </a:p>

</xml_diff>